<commit_message>
Changes on indexes lecture.
</commit_message>
<xml_diff>
--- a/sql/lectures/12_indexes.pptx
+++ b/sql/lectures/12_indexes.pptx
@@ -5,7 +5,7 @@
     <p:sldMasterId id="2147483668" r:id="rId1"/>
   </p:sldMasterIdLst>
   <p:notesMasterIdLst>
-    <p:notesMasterId r:id="rId14"/>
+    <p:notesMasterId r:id="rId22"/>
   </p:notesMasterIdLst>
   <p:sldIdLst>
     <p:sldId id="256" r:id="rId2"/>
@@ -20,6 +20,14 @@
     <p:sldId id="265" r:id="rId11"/>
     <p:sldId id="266" r:id="rId12"/>
     <p:sldId id="267" r:id="rId13"/>
+    <p:sldId id="268" r:id="rId14"/>
+    <p:sldId id="269" r:id="rId15"/>
+    <p:sldId id="270" r:id="rId16"/>
+    <p:sldId id="271" r:id="rId17"/>
+    <p:sldId id="273" r:id="rId18"/>
+    <p:sldId id="274" r:id="rId19"/>
+    <p:sldId id="275" r:id="rId20"/>
+    <p:sldId id="276" r:id="rId21"/>
   </p:sldIdLst>
   <p:sldSz cx="9144000" cy="6858000" type="screen4x3"/>
   <p:notesSz cx="6858000" cy="9144000"/>
@@ -120,7 +128,7 @@
   </p:defaultTextStyle>
   <p:extLst>
     <p:ext uri="{EFAFB233-063F-42B5-8137-9DF3F51BA10A}">
-      <p15:sldGuideLst xmlns="" xmlns:p15="http://schemas.microsoft.com/office/powerpoint/2012/main">
+      <p15:sldGuideLst xmlns:p15="http://schemas.microsoft.com/office/powerpoint/2012/main">
         <p15:guide id="1" orient="horz" pos="2160">
           <p15:clr>
             <a:srgbClr val="A4A3A4"/>
@@ -220,7 +228,7 @@
             <a:fld id="{1C0777A7-133F-4858-8AB3-833D62427676}" type="datetimeFigureOut">
               <a:rPr lang="en-US" smtClean="0"/>
               <a:pPr/>
-              <a:t>11/9/2013</a:t>
+              <a:t>11/23/2013</a:t>
             </a:fld>
             <a:endParaRPr lang="en-US"/>
           </a:p>
@@ -703,7 +711,7 @@
             <a:fld id="{B61BEF0D-F0BB-DE4B-95CE-6DB70DBA9567}" type="datetimeFigureOut">
               <a:rPr lang="en-US" smtClean="0"/>
               <a:pPr/>
-              <a:t>11/9/2013</a:t>
+              <a:t>11/23/2013</a:t>
             </a:fld>
             <a:endParaRPr lang="en-US" dirty="0"/>
           </a:p>
@@ -996,7 +1004,7 @@
             <a:fld id="{B61BEF0D-F0BB-DE4B-95CE-6DB70DBA9567}" type="datetimeFigureOut">
               <a:rPr lang="en-US" smtClean="0"/>
               <a:pPr/>
-              <a:t>11/9/2013</a:t>
+              <a:t>11/23/2013</a:t>
             </a:fld>
             <a:endParaRPr lang="en-US" dirty="0"/>
           </a:p>
@@ -1262,7 +1270,7 @@
             <a:fld id="{B61BEF0D-F0BB-DE4B-95CE-6DB70DBA9567}" type="datetimeFigureOut">
               <a:rPr lang="en-US" smtClean="0"/>
               <a:pPr/>
-              <a:t>11/9/2013</a:t>
+              <a:t>11/23/2013</a:t>
             </a:fld>
             <a:endParaRPr lang="en-US" dirty="0"/>
           </a:p>
@@ -1824,7 +1832,7 @@
             <a:fld id="{B61BEF0D-F0BB-DE4B-95CE-6DB70DBA9567}" type="datetimeFigureOut">
               <a:rPr lang="en-US" smtClean="0"/>
               <a:pPr/>
-              <a:t>11/9/2013</a:t>
+              <a:t>11/23/2013</a:t>
             </a:fld>
             <a:endParaRPr lang="en-US" dirty="0"/>
           </a:p>
@@ -2085,7 +2093,7 @@
             <a:fld id="{B61BEF0D-F0BB-DE4B-95CE-6DB70DBA9567}" type="datetimeFigureOut">
               <a:rPr lang="en-US" smtClean="0"/>
               <a:pPr/>
-              <a:t>11/9/2013</a:t>
+              <a:t>11/23/2013</a:t>
             </a:fld>
             <a:endParaRPr lang="en-US" dirty="0"/>
           </a:p>
@@ -2663,7 +2671,7 @@
             <a:fld id="{B61BEF0D-F0BB-DE4B-95CE-6DB70DBA9567}" type="datetimeFigureOut">
               <a:rPr lang="en-US" smtClean="0"/>
               <a:pPr/>
-              <a:t>11/9/2013</a:t>
+              <a:t>11/23/2013</a:t>
             </a:fld>
             <a:endParaRPr lang="en-US" dirty="0"/>
           </a:p>
@@ -2997,7 +3005,7 @@
             <a:fld id="{B61BEF0D-F0BB-DE4B-95CE-6DB70DBA9567}" type="datetimeFigureOut">
               <a:rPr lang="en-US" smtClean="0"/>
               <a:pPr/>
-              <a:t>11/9/2013</a:t>
+              <a:t>11/23/2013</a:t>
             </a:fld>
             <a:endParaRPr lang="en-US" dirty="0"/>
           </a:p>
@@ -3174,7 +3182,7 @@
             <a:fld id="{B61BEF0D-F0BB-DE4B-95CE-6DB70DBA9567}" type="datetimeFigureOut">
               <a:rPr lang="en-US" smtClean="0"/>
               <a:pPr/>
-              <a:t>11/9/2013</a:t>
+              <a:t>11/23/2013</a:t>
             </a:fld>
             <a:endParaRPr lang="en-US" dirty="0"/>
           </a:p>
@@ -3356,7 +3364,7 @@
             <a:fld id="{B61BEF0D-F0BB-DE4B-95CE-6DB70DBA9567}" type="datetimeFigureOut">
               <a:rPr lang="en-US" smtClean="0"/>
               <a:pPr/>
-              <a:t>11/9/2013</a:t>
+              <a:t>11/23/2013</a:t>
             </a:fld>
             <a:endParaRPr lang="en-US" dirty="0"/>
           </a:p>
@@ -3528,7 +3536,7 @@
             <a:fld id="{B61BEF0D-F0BB-DE4B-95CE-6DB70DBA9567}" type="datetimeFigureOut">
               <a:rPr lang="en-US" smtClean="0"/>
               <a:pPr/>
-              <a:t>11/9/2013</a:t>
+              <a:t>11/23/2013</a:t>
             </a:fld>
             <a:endParaRPr lang="en-US" dirty="0"/>
           </a:p>
@@ -3789,7 +3797,7 @@
             <a:fld id="{B61BEF0D-F0BB-DE4B-95CE-6DB70DBA9567}" type="datetimeFigureOut">
               <a:rPr lang="en-US" smtClean="0"/>
               <a:pPr/>
-              <a:t>11/9/2013</a:t>
+              <a:t>11/23/2013</a:t>
             </a:fld>
             <a:endParaRPr lang="en-US" dirty="0"/>
           </a:p>
@@ -4083,7 +4091,7 @@
             <a:fld id="{B61BEF0D-F0BB-DE4B-95CE-6DB70DBA9567}" type="datetimeFigureOut">
               <a:rPr lang="en-US" smtClean="0"/>
               <a:pPr/>
-              <a:t>11/9/2013</a:t>
+              <a:t>11/23/2013</a:t>
             </a:fld>
             <a:endParaRPr lang="en-US" dirty="0"/>
           </a:p>
@@ -4515,7 +4523,7 @@
             <a:fld id="{B61BEF0D-F0BB-DE4B-95CE-6DB70DBA9567}" type="datetimeFigureOut">
               <a:rPr lang="en-US" smtClean="0"/>
               <a:pPr/>
-              <a:t>11/9/2013</a:t>
+              <a:t>11/23/2013</a:t>
             </a:fld>
             <a:endParaRPr lang="en-US" dirty="0"/>
           </a:p>
@@ -4641,7 +4649,7 @@
             <a:fld id="{B61BEF0D-F0BB-DE4B-95CE-6DB70DBA9567}" type="datetimeFigureOut">
               <a:rPr lang="en-US" smtClean="0"/>
               <a:pPr/>
-              <a:t>11/9/2013</a:t>
+              <a:t>11/23/2013</a:t>
             </a:fld>
             <a:endParaRPr lang="en-US" dirty="0"/>
           </a:p>
@@ -4738,7 +4746,7 @@
             <a:fld id="{B61BEF0D-F0BB-DE4B-95CE-6DB70DBA9567}" type="datetimeFigureOut">
               <a:rPr lang="en-US" smtClean="0"/>
               <a:pPr/>
-              <a:t>11/9/2013</a:t>
+              <a:t>11/23/2013</a:t>
             </a:fld>
             <a:endParaRPr lang="en-US" dirty="0"/>
           </a:p>
@@ -5023,7 +5031,7 @@
             <a:fld id="{B61BEF0D-F0BB-DE4B-95CE-6DB70DBA9567}" type="datetimeFigureOut">
               <a:rPr lang="en-US" smtClean="0"/>
               <a:pPr/>
-              <a:t>11/9/2013</a:t>
+              <a:t>11/23/2013</a:t>
             </a:fld>
             <a:endParaRPr lang="en-US" dirty="0"/>
           </a:p>
@@ -5316,7 +5324,7 @@
             <a:fld id="{B61BEF0D-F0BB-DE4B-95CE-6DB70DBA9567}" type="datetimeFigureOut">
               <a:rPr lang="en-US" smtClean="0"/>
               <a:pPr/>
-              <a:t>11/9/2013</a:t>
+              <a:t>11/23/2013</a:t>
             </a:fld>
             <a:endParaRPr lang="en-US" dirty="0"/>
           </a:p>
@@ -5549,7 +5557,7 @@
             <a:fld id="{B61BEF0D-F0BB-DE4B-95CE-6DB70DBA9567}" type="datetimeFigureOut">
               <a:rPr lang="en-US" smtClean="0"/>
               <a:pPr/>
-              <a:t>11/9/2013</a:t>
+              <a:t>11/23/2013</a:t>
             </a:fld>
             <a:endParaRPr lang="en-US" dirty="0"/>
           </a:p>
@@ -6641,12 +6649,20 @@
               <a:t> индекс используется </a:t>
             </a:r>
             <a:r>
-              <a:rPr lang="ru-RU" dirty="0" err="1" smtClean="0">
+              <a:rPr lang="ru-RU" dirty="0" smtClean="0">
                 <a:solidFill>
                   <a:srgbClr val="FF0000"/>
                 </a:solidFill>
               </a:rPr>
-              <a:t>тольо</a:t>
+              <a:t>толь</a:t>
+            </a:r>
+            <a:r>
+              <a:rPr lang="ru-RU" dirty="0">
+                <a:solidFill>
+                  <a:srgbClr val="FF0000"/>
+                </a:solidFill>
+              </a:rPr>
+              <a:t>к</a:t>
             </a:r>
             <a:r>
               <a:rPr lang="ru-RU" dirty="0" smtClean="0">
@@ -6654,7 +6670,15 @@
                   <a:srgbClr val="FF0000"/>
                 </a:solidFill>
               </a:rPr>
-              <a:t> для операции =)</a:t>
+              <a:t>о </a:t>
+            </a:r>
+            <a:r>
+              <a:rPr lang="ru-RU" dirty="0" smtClean="0">
+                <a:solidFill>
+                  <a:srgbClr val="FF0000"/>
+                </a:solidFill>
+              </a:rPr>
+              <a:t>для операции =)</a:t>
             </a:r>
             <a:endParaRPr lang="en-US" dirty="0" smtClean="0">
               <a:solidFill>
@@ -7288,6 +7312,1659 @@
 </p:sld>
 </file>
 
+<file path=ppt/slides/slide13.xml><?xml version="1.0" encoding="utf-8"?>
+<p:sld xmlns:a="http://schemas.openxmlformats.org/drawingml/2006/main" xmlns:r="http://schemas.openxmlformats.org/officeDocument/2006/relationships" xmlns:p="http://schemas.openxmlformats.org/presentationml/2006/main">
+  <p:cSld>
+    <p:spTree>
+      <p:nvGrpSpPr>
+        <p:cNvPr id="1" name=""/>
+        <p:cNvGrpSpPr/>
+        <p:nvPr/>
+      </p:nvGrpSpPr>
+      <p:grpSpPr>
+        <a:xfrm>
+          <a:off x="0" y="0"/>
+          <a:ext cx="0" cy="0"/>
+          <a:chOff x="0" y="0"/>
+          <a:chExt cx="0" cy="0"/>
+        </a:xfrm>
+      </p:grpSpPr>
+      <p:sp>
+        <p:nvSpPr>
+          <p:cNvPr id="2" name="Title 1"/>
+          <p:cNvSpPr>
+            <a:spLocks noGrp="1"/>
+          </p:cNvSpPr>
+          <p:nvPr>
+            <p:ph type="title"/>
+          </p:nvPr>
+        </p:nvSpPr>
+        <p:spPr/>
+        <p:txBody>
+          <a:bodyPr/>
+          <a:lstStyle/>
+          <a:p>
+            <a:r>
+              <a:rPr lang="ru-RU" dirty="0" smtClean="0"/>
+              <a:t>Недостатки индексов</a:t>
+            </a:r>
+            <a:endParaRPr lang="en-US" dirty="0"/>
+          </a:p>
+        </p:txBody>
+      </p:sp>
+      <p:sp>
+        <p:nvSpPr>
+          <p:cNvPr id="3" name="Content Placeholder 2"/>
+          <p:cNvSpPr>
+            <a:spLocks noGrp="1"/>
+          </p:cNvSpPr>
+          <p:nvPr>
+            <p:ph idx="1"/>
+          </p:nvPr>
+        </p:nvSpPr>
+        <p:spPr/>
+        <p:txBody>
+          <a:bodyPr/>
+          <a:lstStyle/>
+          <a:p>
+            <a:r>
+              <a:rPr lang="ru-RU" dirty="0" smtClean="0"/>
+              <a:t>Нужен дополнительная память для хранения</a:t>
+            </a:r>
+          </a:p>
+          <a:p>
+            <a:r>
+              <a:rPr lang="ru-RU" dirty="0" smtClean="0"/>
+              <a:t>Время на создание индекса</a:t>
+            </a:r>
+          </a:p>
+          <a:p>
+            <a:r>
+              <a:rPr lang="ru-RU" dirty="0" smtClean="0"/>
+              <a:t>Поддержка в актуальном состоянии – может перечеркнуть все выгоды</a:t>
+            </a:r>
+            <a:endParaRPr lang="en-US" dirty="0"/>
+          </a:p>
+        </p:txBody>
+      </p:sp>
+    </p:spTree>
+    <p:extLst>
+      <p:ext uri="{BB962C8B-B14F-4D97-AF65-F5344CB8AC3E}">
+        <p14:creationId xmlns:p14="http://schemas.microsoft.com/office/powerpoint/2010/main" val="559258647"/>
+      </p:ext>
+    </p:extLst>
+  </p:cSld>
+  <p:clrMapOvr>
+    <a:masterClrMapping/>
+  </p:clrMapOvr>
+</p:sld>
+</file>
+
+<file path=ppt/slides/slide14.xml><?xml version="1.0" encoding="utf-8"?>
+<p:sld xmlns:a="http://schemas.openxmlformats.org/drawingml/2006/main" xmlns:r="http://schemas.openxmlformats.org/officeDocument/2006/relationships" xmlns:p="http://schemas.openxmlformats.org/presentationml/2006/main">
+  <p:cSld>
+    <p:spTree>
+      <p:nvGrpSpPr>
+        <p:cNvPr id="1" name=""/>
+        <p:cNvGrpSpPr/>
+        <p:nvPr/>
+      </p:nvGrpSpPr>
+      <p:grpSpPr>
+        <a:xfrm>
+          <a:off x="0" y="0"/>
+          <a:ext cx="0" cy="0"/>
+          <a:chOff x="0" y="0"/>
+          <a:chExt cx="0" cy="0"/>
+        </a:xfrm>
+      </p:grpSpPr>
+      <p:sp>
+        <p:nvSpPr>
+          <p:cNvPr id="2" name="Title 1"/>
+          <p:cNvSpPr>
+            <a:spLocks noGrp="1"/>
+          </p:cNvSpPr>
+          <p:nvPr>
+            <p:ph type="title"/>
+          </p:nvPr>
+        </p:nvSpPr>
+        <p:spPr/>
+        <p:txBody>
+          <a:bodyPr/>
+          <a:lstStyle/>
+          <a:p>
+            <a:r>
+              <a:rPr lang="ru-RU" dirty="0" smtClean="0"/>
+              <a:t>Какой индекс выбрать?</a:t>
+            </a:r>
+            <a:endParaRPr lang="en-US" dirty="0"/>
+          </a:p>
+        </p:txBody>
+      </p:sp>
+      <p:sp>
+        <p:nvSpPr>
+          <p:cNvPr id="3" name="Content Placeholder 2"/>
+          <p:cNvSpPr>
+            <a:spLocks noGrp="1"/>
+          </p:cNvSpPr>
+          <p:nvPr>
+            <p:ph idx="1"/>
+          </p:nvPr>
+        </p:nvSpPr>
+        <p:spPr/>
+        <p:txBody>
+          <a:bodyPr/>
+          <a:lstStyle/>
+          <a:p>
+            <a:pPr marL="0" indent="0">
+              <a:buNone/>
+            </a:pPr>
+            <a:r>
+              <a:rPr lang="ru-RU" dirty="0" smtClean="0"/>
+              <a:t>Выгода от использования индекса зависит от:</a:t>
+            </a:r>
+          </a:p>
+          <a:p>
+            <a:r>
+              <a:rPr lang="ru-RU" dirty="0" smtClean="0"/>
+              <a:t>Размера таблицы (и вероятно от схемы)</a:t>
+            </a:r>
+          </a:p>
+          <a:p>
+            <a:r>
+              <a:rPr lang="ru-RU" dirty="0" smtClean="0"/>
+              <a:t>Распределения данных</a:t>
+            </a:r>
+          </a:p>
+          <a:p>
+            <a:r>
+              <a:rPr lang="ru-RU" dirty="0" smtClean="0"/>
+              <a:t>Использования таблицы (какая операция выполняется чаще – </a:t>
+            </a:r>
+            <a:r>
+              <a:rPr lang="en-US" dirty="0" smtClean="0"/>
+              <a:t>select </a:t>
+            </a:r>
+            <a:r>
+              <a:rPr lang="ru-RU" dirty="0" smtClean="0"/>
+              <a:t>или </a:t>
+            </a:r>
+            <a:r>
+              <a:rPr lang="en-US" dirty="0" smtClean="0"/>
+              <a:t>update)</a:t>
+            </a:r>
+            <a:endParaRPr lang="en-US" dirty="0"/>
+          </a:p>
+        </p:txBody>
+      </p:sp>
+    </p:spTree>
+    <p:extLst>
+      <p:ext uri="{BB962C8B-B14F-4D97-AF65-F5344CB8AC3E}">
+        <p14:creationId xmlns:p14="http://schemas.microsoft.com/office/powerpoint/2010/main" val="1499767643"/>
+      </p:ext>
+    </p:extLst>
+  </p:cSld>
+  <p:clrMapOvr>
+    <a:masterClrMapping/>
+  </p:clrMapOvr>
+</p:sld>
+</file>
+
+<file path=ppt/slides/slide15.xml><?xml version="1.0" encoding="utf-8"?>
+<p:sld xmlns:a="http://schemas.openxmlformats.org/drawingml/2006/main" xmlns:r="http://schemas.openxmlformats.org/officeDocument/2006/relationships" xmlns:p="http://schemas.openxmlformats.org/presentationml/2006/main">
+  <p:cSld>
+    <p:spTree>
+      <p:nvGrpSpPr>
+        <p:cNvPr id="1" name=""/>
+        <p:cNvGrpSpPr/>
+        <p:nvPr/>
+      </p:nvGrpSpPr>
+      <p:grpSpPr>
+        <a:xfrm>
+          <a:off x="0" y="0"/>
+          <a:ext cx="0" cy="0"/>
+          <a:chOff x="0" y="0"/>
+          <a:chExt cx="0" cy="0"/>
+        </a:xfrm>
+      </p:grpSpPr>
+      <p:sp>
+        <p:nvSpPr>
+          <p:cNvPr id="2" name="Title 1"/>
+          <p:cNvSpPr>
+            <a:spLocks noGrp="1"/>
+          </p:cNvSpPr>
+          <p:nvPr>
+            <p:ph type="title"/>
+          </p:nvPr>
+        </p:nvSpPr>
+        <p:spPr/>
+        <p:txBody>
+          <a:bodyPr/>
+          <a:lstStyle/>
+          <a:p>
+            <a:r>
+              <a:rPr lang="en-US" dirty="0" smtClean="0"/>
+              <a:t>“</a:t>
+            </a:r>
+            <a:r>
+              <a:rPr lang="ru-RU" dirty="0" smtClean="0"/>
+              <a:t>Советники физического дизайна</a:t>
+            </a:r>
+            <a:r>
+              <a:rPr lang="en-US" dirty="0" smtClean="0"/>
+              <a:t>”</a:t>
+            </a:r>
+            <a:endParaRPr lang="en-US" dirty="0"/>
+          </a:p>
+        </p:txBody>
+      </p:sp>
+      <p:sp>
+        <p:nvSpPr>
+          <p:cNvPr id="3" name="Content Placeholder 2"/>
+          <p:cNvSpPr>
+            <a:spLocks noGrp="1"/>
+          </p:cNvSpPr>
+          <p:nvPr>
+            <p:ph idx="1"/>
+          </p:nvPr>
+        </p:nvSpPr>
+        <p:spPr/>
+        <p:txBody>
+          <a:bodyPr/>
+          <a:lstStyle/>
+          <a:p>
+            <a:pPr marL="0" indent="0">
+              <a:buNone/>
+            </a:pPr>
+            <a:r>
+              <a:rPr lang="ru-RU" dirty="0" smtClean="0"/>
+              <a:t>Входные данные: база данных (статистика, распределение), использование данных, загрузка</a:t>
+            </a:r>
+          </a:p>
+          <a:p>
+            <a:pPr marL="0" indent="0">
+              <a:buNone/>
+            </a:pPr>
+            <a:r>
+              <a:rPr lang="ru-RU" dirty="0" smtClean="0"/>
+              <a:t>Выходные данные: рекомендованные индексы</a:t>
+            </a:r>
+          </a:p>
+        </p:txBody>
+      </p:sp>
+    </p:spTree>
+    <p:extLst>
+      <p:ext uri="{BB962C8B-B14F-4D97-AF65-F5344CB8AC3E}">
+        <p14:creationId xmlns:p14="http://schemas.microsoft.com/office/powerpoint/2010/main" val="2963068385"/>
+      </p:ext>
+    </p:extLst>
+  </p:cSld>
+  <p:clrMapOvr>
+    <a:masterClrMapping/>
+  </p:clrMapOvr>
+</p:sld>
+</file>
+
+<file path=ppt/slides/slide16.xml><?xml version="1.0" encoding="utf-8"?>
+<p:sld xmlns:a="http://schemas.openxmlformats.org/drawingml/2006/main" xmlns:r="http://schemas.openxmlformats.org/officeDocument/2006/relationships" xmlns:p="http://schemas.openxmlformats.org/presentationml/2006/main">
+  <p:cSld>
+    <p:spTree>
+      <p:nvGrpSpPr>
+        <p:cNvPr id="1" name=""/>
+        <p:cNvGrpSpPr/>
+        <p:nvPr/>
+      </p:nvGrpSpPr>
+      <p:grpSpPr>
+        <a:xfrm>
+          <a:off x="0" y="0"/>
+          <a:ext cx="0" cy="0"/>
+          <a:chOff x="0" y="0"/>
+          <a:chExt cx="0" cy="0"/>
+        </a:xfrm>
+      </p:grpSpPr>
+      <p:sp>
+        <p:nvSpPr>
+          <p:cNvPr id="2" name="Title 1"/>
+          <p:cNvSpPr>
+            <a:spLocks noGrp="1"/>
+          </p:cNvSpPr>
+          <p:nvPr>
+            <p:ph type="title"/>
+          </p:nvPr>
+        </p:nvSpPr>
+        <p:spPr/>
+        <p:txBody>
+          <a:bodyPr/>
+          <a:lstStyle/>
+          <a:p>
+            <a:r>
+              <a:rPr lang="en-US" dirty="0" smtClean="0"/>
+              <a:t>“</a:t>
+            </a:r>
+            <a:r>
+              <a:rPr lang="ru-RU" dirty="0" smtClean="0"/>
+              <a:t>Советники физического дизайна</a:t>
+            </a:r>
+            <a:r>
+              <a:rPr lang="en-US" dirty="0" smtClean="0"/>
+              <a:t>”</a:t>
+            </a:r>
+            <a:endParaRPr lang="en-US" dirty="0"/>
+          </a:p>
+        </p:txBody>
+      </p:sp>
+      <p:sp>
+        <p:nvSpPr>
+          <p:cNvPr id="3" name="Content Placeholder 2"/>
+          <p:cNvSpPr>
+            <a:spLocks noGrp="1"/>
+          </p:cNvSpPr>
+          <p:nvPr>
+            <p:ph idx="1"/>
+          </p:nvPr>
+        </p:nvSpPr>
+        <p:spPr>
+          <a:xfrm>
+            <a:off x="818348" y="2060898"/>
+            <a:ext cx="7511472" cy="1176572"/>
+          </a:xfrm>
+        </p:spPr>
+        <p:txBody>
+          <a:bodyPr/>
+          <a:lstStyle/>
+          <a:p>
+            <a:pPr marL="0" indent="0">
+              <a:buNone/>
+            </a:pPr>
+            <a:r>
+              <a:rPr lang="ru-RU" dirty="0" smtClean="0"/>
+              <a:t>Входные данные: база данных (статистика, распределение), использование данных, загрузка</a:t>
+            </a:r>
+          </a:p>
+          <a:p>
+            <a:pPr marL="0" indent="0">
+              <a:buNone/>
+            </a:pPr>
+            <a:r>
+              <a:rPr lang="ru-RU" dirty="0" smtClean="0"/>
+              <a:t>Выходные данные: рекомендованные индексы</a:t>
+            </a:r>
+          </a:p>
+        </p:txBody>
+      </p:sp>
+      <p:sp>
+        <p:nvSpPr>
+          <p:cNvPr id="5" name="Rounded Rectangle 4"/>
+          <p:cNvSpPr/>
+          <p:nvPr/>
+        </p:nvSpPr>
+        <p:spPr>
+          <a:xfrm>
+            <a:off x="5622325" y="4143632"/>
+            <a:ext cx="1977081" cy="877330"/>
+          </a:xfrm>
+          <a:prstGeom prst="roundRect">
+            <a:avLst/>
+          </a:prstGeom>
+        </p:spPr>
+        <p:style>
+          <a:lnRef idx="2">
+            <a:schemeClr val="accent1">
+              <a:shade val="50000"/>
+            </a:schemeClr>
+          </a:lnRef>
+          <a:fillRef idx="1">
+            <a:schemeClr val="accent1"/>
+          </a:fillRef>
+          <a:effectRef idx="0">
+            <a:schemeClr val="accent1"/>
+          </a:effectRef>
+          <a:fontRef idx="minor">
+            <a:schemeClr val="lt1"/>
+          </a:fontRef>
+        </p:style>
+        <p:txBody>
+          <a:bodyPr rtlCol="0" anchor="ctr"/>
+          <a:lstStyle/>
+          <a:p>
+            <a:pPr algn="ctr"/>
+            <a:endParaRPr lang="en-US"/>
+          </a:p>
+        </p:txBody>
+      </p:sp>
+      <p:sp>
+        <p:nvSpPr>
+          <p:cNvPr id="4" name="TextBox 3"/>
+          <p:cNvSpPr txBox="1"/>
+          <p:nvPr/>
+        </p:nvSpPr>
+        <p:spPr>
+          <a:xfrm>
+            <a:off x="5735465" y="4259131"/>
+            <a:ext cx="1750800" cy="646331"/>
+          </a:xfrm>
+          <a:prstGeom prst="rect">
+            <a:avLst/>
+          </a:prstGeom>
+          <a:noFill/>
+        </p:spPr>
+        <p:txBody>
+          <a:bodyPr wrap="none" rtlCol="0">
+            <a:spAutoFit/>
+          </a:bodyPr>
+          <a:lstStyle/>
+          <a:p>
+            <a:pPr algn="ctr"/>
+            <a:r>
+              <a:rPr lang="ru-RU" dirty="0" smtClean="0"/>
+              <a:t>Оптимизатор</a:t>
+            </a:r>
+          </a:p>
+          <a:p>
+            <a:pPr algn="ctr"/>
+            <a:r>
+              <a:rPr lang="ru-RU" dirty="0" smtClean="0"/>
+              <a:t>запросов</a:t>
+            </a:r>
+            <a:endParaRPr lang="en-US" dirty="0"/>
+          </a:p>
+        </p:txBody>
+      </p:sp>
+      <p:sp>
+        <p:nvSpPr>
+          <p:cNvPr id="6" name="TextBox 5"/>
+          <p:cNvSpPr txBox="1"/>
+          <p:nvPr/>
+        </p:nvSpPr>
+        <p:spPr>
+          <a:xfrm>
+            <a:off x="818347" y="4074465"/>
+            <a:ext cx="3906839" cy="369332"/>
+          </a:xfrm>
+          <a:prstGeom prst="rect">
+            <a:avLst/>
+          </a:prstGeom>
+          <a:noFill/>
+        </p:spPr>
+        <p:txBody>
+          <a:bodyPr wrap="none" rtlCol="0">
+            <a:spAutoFit/>
+          </a:bodyPr>
+          <a:lstStyle/>
+          <a:p>
+            <a:r>
+              <a:rPr lang="ru-RU" dirty="0" smtClean="0"/>
+              <a:t>Статистика использования базы</a:t>
+            </a:r>
+            <a:endParaRPr lang="en-US" dirty="0"/>
+          </a:p>
+        </p:txBody>
+      </p:sp>
+      <p:cxnSp>
+        <p:nvCxnSpPr>
+          <p:cNvPr id="8" name="Straight Arrow Connector 7"/>
+          <p:cNvCxnSpPr>
+            <a:stCxn id="6" idx="3"/>
+          </p:cNvCxnSpPr>
+          <p:nvPr/>
+        </p:nvCxnSpPr>
+        <p:spPr>
+          <a:xfrm>
+            <a:off x="4725186" y="4259131"/>
+            <a:ext cx="820195" cy="378343"/>
+          </a:xfrm>
+          <a:prstGeom prst="straightConnector1">
+            <a:avLst/>
+          </a:prstGeom>
+          <a:ln>
+            <a:tailEnd type="triangle"/>
+          </a:ln>
+        </p:spPr>
+        <p:style>
+          <a:lnRef idx="3">
+            <a:schemeClr val="accent1"/>
+          </a:lnRef>
+          <a:fillRef idx="0">
+            <a:schemeClr val="accent1"/>
+          </a:fillRef>
+          <a:effectRef idx="2">
+            <a:schemeClr val="accent1"/>
+          </a:effectRef>
+          <a:fontRef idx="minor">
+            <a:schemeClr val="tx1"/>
+          </a:fontRef>
+        </p:style>
+      </p:cxnSp>
+      <p:sp>
+        <p:nvSpPr>
+          <p:cNvPr id="9" name="TextBox 8"/>
+          <p:cNvSpPr txBox="1"/>
+          <p:nvPr/>
+        </p:nvSpPr>
+        <p:spPr>
+          <a:xfrm>
+            <a:off x="818347" y="4521712"/>
+            <a:ext cx="3829895" cy="369332"/>
+          </a:xfrm>
+          <a:prstGeom prst="rect">
+            <a:avLst/>
+          </a:prstGeom>
+          <a:noFill/>
+        </p:spPr>
+        <p:txBody>
+          <a:bodyPr wrap="none" rtlCol="0">
+            <a:spAutoFit/>
+          </a:bodyPr>
+          <a:lstStyle/>
+          <a:p>
+            <a:r>
+              <a:rPr lang="ru-RU" dirty="0" smtClean="0"/>
+              <a:t>Запрос или изменение данных</a:t>
+            </a:r>
+            <a:endParaRPr lang="en-US" dirty="0"/>
+          </a:p>
+        </p:txBody>
+      </p:sp>
+      <p:sp>
+        <p:nvSpPr>
+          <p:cNvPr id="10" name="TextBox 9"/>
+          <p:cNvSpPr txBox="1"/>
+          <p:nvPr/>
+        </p:nvSpPr>
+        <p:spPr>
+          <a:xfrm>
+            <a:off x="818347" y="4979255"/>
+            <a:ext cx="3116559" cy="369332"/>
+          </a:xfrm>
+          <a:prstGeom prst="rect">
+            <a:avLst/>
+          </a:prstGeom>
+          <a:noFill/>
+        </p:spPr>
+        <p:txBody>
+          <a:bodyPr wrap="none" rtlCol="0">
+            <a:spAutoFit/>
+          </a:bodyPr>
+          <a:lstStyle/>
+          <a:p>
+            <a:r>
+              <a:rPr lang="ru-RU" dirty="0" smtClean="0"/>
+              <a:t>Существующие индексы</a:t>
+            </a:r>
+            <a:endParaRPr lang="en-US" dirty="0"/>
+          </a:p>
+        </p:txBody>
+      </p:sp>
+      <p:cxnSp>
+        <p:nvCxnSpPr>
+          <p:cNvPr id="11" name="Straight Arrow Connector 10"/>
+          <p:cNvCxnSpPr>
+            <a:stCxn id="9" idx="3"/>
+          </p:cNvCxnSpPr>
+          <p:nvPr/>
+        </p:nvCxnSpPr>
+        <p:spPr>
+          <a:xfrm>
+            <a:off x="4648242" y="4706378"/>
+            <a:ext cx="916417" cy="28318"/>
+          </a:xfrm>
+          <a:prstGeom prst="straightConnector1">
+            <a:avLst/>
+          </a:prstGeom>
+          <a:ln>
+            <a:tailEnd type="triangle"/>
+          </a:ln>
+        </p:spPr>
+        <p:style>
+          <a:lnRef idx="3">
+            <a:schemeClr val="accent1"/>
+          </a:lnRef>
+          <a:fillRef idx="0">
+            <a:schemeClr val="accent1"/>
+          </a:fillRef>
+          <a:effectRef idx="2">
+            <a:schemeClr val="accent1"/>
+          </a:effectRef>
+          <a:fontRef idx="minor">
+            <a:schemeClr val="tx1"/>
+          </a:fontRef>
+        </p:style>
+      </p:cxnSp>
+      <p:cxnSp>
+        <p:nvCxnSpPr>
+          <p:cNvPr id="13" name="Straight Arrow Connector 12"/>
+          <p:cNvCxnSpPr/>
+          <p:nvPr/>
+        </p:nvCxnSpPr>
+        <p:spPr>
+          <a:xfrm flipV="1">
+            <a:off x="4048046" y="4861098"/>
+            <a:ext cx="1516613" cy="302823"/>
+          </a:xfrm>
+          <a:prstGeom prst="straightConnector1">
+            <a:avLst/>
+          </a:prstGeom>
+          <a:ln>
+            <a:tailEnd type="triangle"/>
+          </a:ln>
+        </p:spPr>
+        <p:style>
+          <a:lnRef idx="3">
+            <a:schemeClr val="accent1"/>
+          </a:lnRef>
+          <a:fillRef idx="0">
+            <a:schemeClr val="accent1"/>
+          </a:fillRef>
+          <a:effectRef idx="2">
+            <a:schemeClr val="accent1"/>
+          </a:effectRef>
+          <a:fontRef idx="minor">
+            <a:schemeClr val="tx1"/>
+          </a:fontRef>
+        </p:style>
+      </p:cxnSp>
+      <p:cxnSp>
+        <p:nvCxnSpPr>
+          <p:cNvPr id="17" name="Straight Arrow Connector 16"/>
+          <p:cNvCxnSpPr/>
+          <p:nvPr/>
+        </p:nvCxnSpPr>
+        <p:spPr>
+          <a:xfrm>
+            <a:off x="6722076" y="5134486"/>
+            <a:ext cx="1" cy="374653"/>
+          </a:xfrm>
+          <a:prstGeom prst="straightConnector1">
+            <a:avLst/>
+          </a:prstGeom>
+          <a:ln>
+            <a:tailEnd type="triangle"/>
+          </a:ln>
+        </p:spPr>
+        <p:style>
+          <a:lnRef idx="3">
+            <a:schemeClr val="accent1"/>
+          </a:lnRef>
+          <a:fillRef idx="0">
+            <a:schemeClr val="accent1"/>
+          </a:fillRef>
+          <a:effectRef idx="2">
+            <a:schemeClr val="accent1"/>
+          </a:effectRef>
+          <a:fontRef idx="minor">
+            <a:schemeClr val="tx1"/>
+          </a:fontRef>
+        </p:style>
+      </p:cxnSp>
+      <p:sp>
+        <p:nvSpPr>
+          <p:cNvPr id="20" name="TextBox 19"/>
+          <p:cNvSpPr txBox="1"/>
+          <p:nvPr/>
+        </p:nvSpPr>
+        <p:spPr>
+          <a:xfrm>
+            <a:off x="5334516" y="5614333"/>
+            <a:ext cx="2775119" cy="923330"/>
+          </a:xfrm>
+          <a:prstGeom prst="rect">
+            <a:avLst/>
+          </a:prstGeom>
+          <a:noFill/>
+        </p:spPr>
+        <p:txBody>
+          <a:bodyPr wrap="none" rtlCol="0">
+            <a:spAutoFit/>
+          </a:bodyPr>
+          <a:lstStyle/>
+          <a:p>
+            <a:pPr algn="ctr"/>
+            <a:r>
+              <a:rPr lang="ru-RU" dirty="0" smtClean="0"/>
+              <a:t>Лучший план запроса</a:t>
+            </a:r>
+          </a:p>
+          <a:p>
+            <a:pPr algn="ctr"/>
+            <a:r>
+              <a:rPr lang="ru-RU" dirty="0" smtClean="0"/>
+              <a:t>с оценкой времени</a:t>
+            </a:r>
+          </a:p>
+          <a:p>
+            <a:pPr algn="ctr"/>
+            <a:r>
+              <a:rPr lang="ru-RU" dirty="0" smtClean="0"/>
+              <a:t>выполнения</a:t>
+            </a:r>
+            <a:endParaRPr lang="en-US" dirty="0"/>
+          </a:p>
+        </p:txBody>
+      </p:sp>
+    </p:spTree>
+    <p:extLst>
+      <p:ext uri="{BB962C8B-B14F-4D97-AF65-F5344CB8AC3E}">
+        <p14:creationId xmlns:p14="http://schemas.microsoft.com/office/powerpoint/2010/main" val="2913243822"/>
+      </p:ext>
+    </p:extLst>
+  </p:cSld>
+  <p:clrMapOvr>
+    <a:masterClrMapping/>
+  </p:clrMapOvr>
+</p:sld>
+</file>
+
+<file path=ppt/slides/slide17.xml><?xml version="1.0" encoding="utf-8"?>
+<p:sld xmlns:a="http://schemas.openxmlformats.org/drawingml/2006/main" xmlns:r="http://schemas.openxmlformats.org/officeDocument/2006/relationships" xmlns:p="http://schemas.openxmlformats.org/presentationml/2006/main">
+  <p:cSld>
+    <p:spTree>
+      <p:nvGrpSpPr>
+        <p:cNvPr id="1" name=""/>
+        <p:cNvGrpSpPr/>
+        <p:nvPr/>
+      </p:nvGrpSpPr>
+      <p:grpSpPr>
+        <a:xfrm>
+          <a:off x="0" y="0"/>
+          <a:ext cx="0" cy="0"/>
+          <a:chOff x="0" y="0"/>
+          <a:chExt cx="0" cy="0"/>
+        </a:xfrm>
+      </p:grpSpPr>
+      <p:sp>
+        <p:nvSpPr>
+          <p:cNvPr id="12" name="Rounded Rectangle 11"/>
+          <p:cNvSpPr/>
+          <p:nvPr/>
+        </p:nvSpPr>
+        <p:spPr>
+          <a:xfrm>
+            <a:off x="580768" y="2060898"/>
+            <a:ext cx="7018638" cy="781156"/>
+          </a:xfrm>
+          <a:prstGeom prst="roundRect">
+            <a:avLst/>
+          </a:prstGeom>
+        </p:spPr>
+        <p:style>
+          <a:lnRef idx="2">
+            <a:schemeClr val="accent1">
+              <a:shade val="50000"/>
+            </a:schemeClr>
+          </a:lnRef>
+          <a:fillRef idx="1">
+            <a:schemeClr val="accent1"/>
+          </a:fillRef>
+          <a:effectRef idx="0">
+            <a:schemeClr val="accent1"/>
+          </a:effectRef>
+          <a:fontRef idx="minor">
+            <a:schemeClr val="lt1"/>
+          </a:fontRef>
+        </p:style>
+        <p:txBody>
+          <a:bodyPr rtlCol="0" anchor="ctr"/>
+          <a:lstStyle/>
+          <a:p>
+            <a:pPr algn="ctr"/>
+            <a:endParaRPr lang="en-US"/>
+          </a:p>
+        </p:txBody>
+      </p:sp>
+      <p:sp>
+        <p:nvSpPr>
+          <p:cNvPr id="7" name="Rounded Rectangle 6"/>
+          <p:cNvSpPr/>
+          <p:nvPr/>
+        </p:nvSpPr>
+        <p:spPr>
+          <a:xfrm>
+            <a:off x="580768" y="3756454"/>
+            <a:ext cx="7895967" cy="2903838"/>
+          </a:xfrm>
+          <a:prstGeom prst="roundRect">
+            <a:avLst/>
+          </a:prstGeom>
+        </p:spPr>
+        <p:style>
+          <a:lnRef idx="2">
+            <a:schemeClr val="accent1">
+              <a:shade val="50000"/>
+            </a:schemeClr>
+          </a:lnRef>
+          <a:fillRef idx="1">
+            <a:schemeClr val="accent1"/>
+          </a:fillRef>
+          <a:effectRef idx="0">
+            <a:schemeClr val="accent1"/>
+          </a:effectRef>
+          <a:fontRef idx="minor">
+            <a:schemeClr val="lt1"/>
+          </a:fontRef>
+        </p:style>
+        <p:txBody>
+          <a:bodyPr rtlCol="0" anchor="ctr"/>
+          <a:lstStyle/>
+          <a:p>
+            <a:pPr algn="ctr"/>
+            <a:endParaRPr lang="en-US"/>
+          </a:p>
+        </p:txBody>
+      </p:sp>
+      <p:sp>
+        <p:nvSpPr>
+          <p:cNvPr id="2" name="Title 1"/>
+          <p:cNvSpPr>
+            <a:spLocks noGrp="1"/>
+          </p:cNvSpPr>
+          <p:nvPr>
+            <p:ph type="title"/>
+          </p:nvPr>
+        </p:nvSpPr>
+        <p:spPr/>
+        <p:txBody>
+          <a:bodyPr/>
+          <a:lstStyle/>
+          <a:p>
+            <a:r>
+              <a:rPr lang="en-US" dirty="0" smtClean="0"/>
+              <a:t>“</a:t>
+            </a:r>
+            <a:r>
+              <a:rPr lang="ru-RU" dirty="0" smtClean="0"/>
+              <a:t>Советники физического дизайна</a:t>
+            </a:r>
+            <a:r>
+              <a:rPr lang="en-US" dirty="0" smtClean="0"/>
+              <a:t>”</a:t>
+            </a:r>
+            <a:endParaRPr lang="en-US" dirty="0"/>
+          </a:p>
+        </p:txBody>
+      </p:sp>
+      <p:sp>
+        <p:nvSpPr>
+          <p:cNvPr id="3" name="Content Placeholder 2"/>
+          <p:cNvSpPr>
+            <a:spLocks noGrp="1"/>
+          </p:cNvSpPr>
+          <p:nvPr>
+            <p:ph idx="1"/>
+          </p:nvPr>
+        </p:nvSpPr>
+        <p:spPr>
+          <a:xfrm>
+            <a:off x="818348" y="2060898"/>
+            <a:ext cx="7511472" cy="1176572"/>
+          </a:xfrm>
+        </p:spPr>
+        <p:txBody>
+          <a:bodyPr/>
+          <a:lstStyle/>
+          <a:p>
+            <a:pPr marL="0" indent="0">
+              <a:buNone/>
+            </a:pPr>
+            <a:r>
+              <a:rPr lang="ru-RU" dirty="0" smtClean="0"/>
+              <a:t>Входные данные: база данных (статистика, распределение), использование данных, загрузка</a:t>
+            </a:r>
+          </a:p>
+          <a:p>
+            <a:pPr marL="0" indent="0">
+              <a:buNone/>
+            </a:pPr>
+            <a:r>
+              <a:rPr lang="ru-RU" dirty="0" smtClean="0"/>
+              <a:t>Выходные данные: рекомендованные индексы</a:t>
+            </a:r>
+          </a:p>
+        </p:txBody>
+      </p:sp>
+      <p:sp>
+        <p:nvSpPr>
+          <p:cNvPr id="5" name="Rounded Rectangle 4"/>
+          <p:cNvSpPr/>
+          <p:nvPr/>
+        </p:nvSpPr>
+        <p:spPr>
+          <a:xfrm>
+            <a:off x="5622325" y="4143632"/>
+            <a:ext cx="1977081" cy="877330"/>
+          </a:xfrm>
+          <a:prstGeom prst="roundRect">
+            <a:avLst/>
+          </a:prstGeom>
+        </p:spPr>
+        <p:style>
+          <a:lnRef idx="2">
+            <a:schemeClr val="accent1">
+              <a:shade val="50000"/>
+            </a:schemeClr>
+          </a:lnRef>
+          <a:fillRef idx="1">
+            <a:schemeClr val="accent1"/>
+          </a:fillRef>
+          <a:effectRef idx="0">
+            <a:schemeClr val="accent1"/>
+          </a:effectRef>
+          <a:fontRef idx="minor">
+            <a:schemeClr val="lt1"/>
+          </a:fontRef>
+        </p:style>
+        <p:txBody>
+          <a:bodyPr rtlCol="0" anchor="ctr"/>
+          <a:lstStyle/>
+          <a:p>
+            <a:pPr algn="ctr"/>
+            <a:endParaRPr lang="en-US"/>
+          </a:p>
+        </p:txBody>
+      </p:sp>
+      <p:sp>
+        <p:nvSpPr>
+          <p:cNvPr id="4" name="TextBox 3"/>
+          <p:cNvSpPr txBox="1"/>
+          <p:nvPr/>
+        </p:nvSpPr>
+        <p:spPr>
+          <a:xfrm>
+            <a:off x="5735465" y="4259131"/>
+            <a:ext cx="1750800" cy="646331"/>
+          </a:xfrm>
+          <a:prstGeom prst="rect">
+            <a:avLst/>
+          </a:prstGeom>
+          <a:noFill/>
+        </p:spPr>
+        <p:txBody>
+          <a:bodyPr wrap="none" rtlCol="0">
+            <a:spAutoFit/>
+          </a:bodyPr>
+          <a:lstStyle/>
+          <a:p>
+            <a:pPr algn="ctr"/>
+            <a:r>
+              <a:rPr lang="ru-RU" dirty="0" smtClean="0"/>
+              <a:t>Оптимизатор</a:t>
+            </a:r>
+          </a:p>
+          <a:p>
+            <a:pPr algn="ctr"/>
+            <a:r>
+              <a:rPr lang="ru-RU" dirty="0" smtClean="0"/>
+              <a:t>запросов</a:t>
+            </a:r>
+            <a:endParaRPr lang="en-US" dirty="0"/>
+          </a:p>
+        </p:txBody>
+      </p:sp>
+      <p:sp>
+        <p:nvSpPr>
+          <p:cNvPr id="6" name="TextBox 5"/>
+          <p:cNvSpPr txBox="1"/>
+          <p:nvPr/>
+        </p:nvSpPr>
+        <p:spPr>
+          <a:xfrm>
+            <a:off x="818347" y="4074465"/>
+            <a:ext cx="3906839" cy="369332"/>
+          </a:xfrm>
+          <a:prstGeom prst="rect">
+            <a:avLst/>
+          </a:prstGeom>
+          <a:noFill/>
+        </p:spPr>
+        <p:txBody>
+          <a:bodyPr wrap="none" rtlCol="0">
+            <a:spAutoFit/>
+          </a:bodyPr>
+          <a:lstStyle/>
+          <a:p>
+            <a:r>
+              <a:rPr lang="ru-RU" dirty="0" smtClean="0"/>
+              <a:t>Статистика использования базы</a:t>
+            </a:r>
+            <a:endParaRPr lang="en-US" dirty="0"/>
+          </a:p>
+        </p:txBody>
+      </p:sp>
+      <p:cxnSp>
+        <p:nvCxnSpPr>
+          <p:cNvPr id="8" name="Straight Arrow Connector 7"/>
+          <p:cNvCxnSpPr>
+            <a:stCxn id="6" idx="3"/>
+          </p:cNvCxnSpPr>
+          <p:nvPr/>
+        </p:nvCxnSpPr>
+        <p:spPr>
+          <a:xfrm>
+            <a:off x="4725186" y="4259131"/>
+            <a:ext cx="820195" cy="378343"/>
+          </a:xfrm>
+          <a:prstGeom prst="straightConnector1">
+            <a:avLst/>
+          </a:prstGeom>
+          <a:ln>
+            <a:tailEnd type="triangle"/>
+          </a:ln>
+        </p:spPr>
+        <p:style>
+          <a:lnRef idx="3">
+            <a:schemeClr val="accent1"/>
+          </a:lnRef>
+          <a:fillRef idx="0">
+            <a:schemeClr val="accent1"/>
+          </a:fillRef>
+          <a:effectRef idx="2">
+            <a:schemeClr val="accent1"/>
+          </a:effectRef>
+          <a:fontRef idx="minor">
+            <a:schemeClr val="tx1"/>
+          </a:fontRef>
+        </p:style>
+      </p:cxnSp>
+      <p:sp>
+        <p:nvSpPr>
+          <p:cNvPr id="9" name="TextBox 8"/>
+          <p:cNvSpPr txBox="1"/>
+          <p:nvPr/>
+        </p:nvSpPr>
+        <p:spPr>
+          <a:xfrm>
+            <a:off x="818347" y="4521712"/>
+            <a:ext cx="3829895" cy="369332"/>
+          </a:xfrm>
+          <a:prstGeom prst="rect">
+            <a:avLst/>
+          </a:prstGeom>
+          <a:noFill/>
+        </p:spPr>
+        <p:txBody>
+          <a:bodyPr wrap="none" rtlCol="0">
+            <a:spAutoFit/>
+          </a:bodyPr>
+          <a:lstStyle/>
+          <a:p>
+            <a:r>
+              <a:rPr lang="ru-RU" dirty="0" smtClean="0"/>
+              <a:t>Запрос или изменение данных</a:t>
+            </a:r>
+            <a:endParaRPr lang="en-US" dirty="0"/>
+          </a:p>
+        </p:txBody>
+      </p:sp>
+      <p:sp>
+        <p:nvSpPr>
+          <p:cNvPr id="10" name="TextBox 9"/>
+          <p:cNvSpPr txBox="1"/>
+          <p:nvPr/>
+        </p:nvSpPr>
+        <p:spPr>
+          <a:xfrm>
+            <a:off x="818347" y="4979255"/>
+            <a:ext cx="3116559" cy="369332"/>
+          </a:xfrm>
+          <a:prstGeom prst="rect">
+            <a:avLst/>
+          </a:prstGeom>
+          <a:noFill/>
+        </p:spPr>
+        <p:txBody>
+          <a:bodyPr wrap="none" rtlCol="0">
+            <a:spAutoFit/>
+          </a:bodyPr>
+          <a:lstStyle/>
+          <a:p>
+            <a:r>
+              <a:rPr lang="ru-RU" dirty="0" smtClean="0">
+                <a:solidFill>
+                  <a:srgbClr val="FF0000"/>
+                </a:solidFill>
+              </a:rPr>
+              <a:t>Существующие индексы</a:t>
+            </a:r>
+            <a:endParaRPr lang="en-US" dirty="0">
+              <a:solidFill>
+                <a:srgbClr val="FF0000"/>
+              </a:solidFill>
+            </a:endParaRPr>
+          </a:p>
+        </p:txBody>
+      </p:sp>
+      <p:cxnSp>
+        <p:nvCxnSpPr>
+          <p:cNvPr id="11" name="Straight Arrow Connector 10"/>
+          <p:cNvCxnSpPr>
+            <a:stCxn id="9" idx="3"/>
+          </p:cNvCxnSpPr>
+          <p:nvPr/>
+        </p:nvCxnSpPr>
+        <p:spPr>
+          <a:xfrm>
+            <a:off x="4648242" y="4706378"/>
+            <a:ext cx="916417" cy="28318"/>
+          </a:xfrm>
+          <a:prstGeom prst="straightConnector1">
+            <a:avLst/>
+          </a:prstGeom>
+          <a:ln>
+            <a:tailEnd type="triangle"/>
+          </a:ln>
+        </p:spPr>
+        <p:style>
+          <a:lnRef idx="3">
+            <a:schemeClr val="accent1"/>
+          </a:lnRef>
+          <a:fillRef idx="0">
+            <a:schemeClr val="accent1"/>
+          </a:fillRef>
+          <a:effectRef idx="2">
+            <a:schemeClr val="accent1"/>
+          </a:effectRef>
+          <a:fontRef idx="minor">
+            <a:schemeClr val="tx1"/>
+          </a:fontRef>
+        </p:style>
+      </p:cxnSp>
+      <p:cxnSp>
+        <p:nvCxnSpPr>
+          <p:cNvPr id="13" name="Straight Arrow Connector 12"/>
+          <p:cNvCxnSpPr/>
+          <p:nvPr/>
+        </p:nvCxnSpPr>
+        <p:spPr>
+          <a:xfrm flipV="1">
+            <a:off x="4048046" y="4861098"/>
+            <a:ext cx="1516613" cy="302823"/>
+          </a:xfrm>
+          <a:prstGeom prst="straightConnector1">
+            <a:avLst/>
+          </a:prstGeom>
+          <a:ln>
+            <a:tailEnd type="triangle"/>
+          </a:ln>
+        </p:spPr>
+        <p:style>
+          <a:lnRef idx="3">
+            <a:schemeClr val="accent1"/>
+          </a:lnRef>
+          <a:fillRef idx="0">
+            <a:schemeClr val="accent1"/>
+          </a:fillRef>
+          <a:effectRef idx="2">
+            <a:schemeClr val="accent1"/>
+          </a:effectRef>
+          <a:fontRef idx="minor">
+            <a:schemeClr val="tx1"/>
+          </a:fontRef>
+        </p:style>
+      </p:cxnSp>
+      <p:cxnSp>
+        <p:nvCxnSpPr>
+          <p:cNvPr id="17" name="Straight Arrow Connector 16"/>
+          <p:cNvCxnSpPr/>
+          <p:nvPr/>
+        </p:nvCxnSpPr>
+        <p:spPr>
+          <a:xfrm>
+            <a:off x="6722076" y="5134486"/>
+            <a:ext cx="1" cy="374653"/>
+          </a:xfrm>
+          <a:prstGeom prst="straightConnector1">
+            <a:avLst/>
+          </a:prstGeom>
+          <a:ln>
+            <a:tailEnd type="triangle"/>
+          </a:ln>
+        </p:spPr>
+        <p:style>
+          <a:lnRef idx="3">
+            <a:schemeClr val="accent1"/>
+          </a:lnRef>
+          <a:fillRef idx="0">
+            <a:schemeClr val="accent1"/>
+          </a:fillRef>
+          <a:effectRef idx="2">
+            <a:schemeClr val="accent1"/>
+          </a:effectRef>
+          <a:fontRef idx="minor">
+            <a:schemeClr val="tx1"/>
+          </a:fontRef>
+        </p:style>
+      </p:cxnSp>
+      <p:sp>
+        <p:nvSpPr>
+          <p:cNvPr id="20" name="TextBox 19"/>
+          <p:cNvSpPr txBox="1"/>
+          <p:nvPr/>
+        </p:nvSpPr>
+        <p:spPr>
+          <a:xfrm>
+            <a:off x="5334516" y="5614333"/>
+            <a:ext cx="2775119" cy="923330"/>
+          </a:xfrm>
+          <a:prstGeom prst="rect">
+            <a:avLst/>
+          </a:prstGeom>
+          <a:noFill/>
+        </p:spPr>
+        <p:txBody>
+          <a:bodyPr wrap="none" rtlCol="0">
+            <a:spAutoFit/>
+          </a:bodyPr>
+          <a:lstStyle/>
+          <a:p>
+            <a:pPr algn="ctr"/>
+            <a:r>
+              <a:rPr lang="ru-RU" dirty="0" smtClean="0"/>
+              <a:t>Лучший план запроса</a:t>
+            </a:r>
+          </a:p>
+          <a:p>
+            <a:pPr algn="ctr"/>
+            <a:r>
+              <a:rPr lang="ru-RU" dirty="0" smtClean="0"/>
+              <a:t>с оценкой времени</a:t>
+            </a:r>
+          </a:p>
+          <a:p>
+            <a:pPr algn="ctr"/>
+            <a:r>
+              <a:rPr lang="ru-RU" dirty="0" smtClean="0"/>
+              <a:t>выполнения</a:t>
+            </a:r>
+            <a:endParaRPr lang="en-US" dirty="0"/>
+          </a:p>
+        </p:txBody>
+      </p:sp>
+      <p:sp>
+        <p:nvSpPr>
+          <p:cNvPr id="14" name="Right Arrow 13"/>
+          <p:cNvSpPr/>
+          <p:nvPr/>
+        </p:nvSpPr>
+        <p:spPr>
+          <a:xfrm rot="4696914">
+            <a:off x="265671" y="2946567"/>
+            <a:ext cx="630195" cy="775481"/>
+          </a:xfrm>
+          <a:prstGeom prst="rightArrow">
+            <a:avLst/>
+          </a:prstGeom>
+        </p:spPr>
+        <p:style>
+          <a:lnRef idx="2">
+            <a:schemeClr val="accent1">
+              <a:shade val="50000"/>
+            </a:schemeClr>
+          </a:lnRef>
+          <a:fillRef idx="1">
+            <a:schemeClr val="accent1"/>
+          </a:fillRef>
+          <a:effectRef idx="0">
+            <a:schemeClr val="accent1"/>
+          </a:effectRef>
+          <a:fontRef idx="minor">
+            <a:schemeClr val="lt1"/>
+          </a:fontRef>
+        </p:style>
+        <p:txBody>
+          <a:bodyPr rtlCol="0" anchor="ctr"/>
+          <a:lstStyle/>
+          <a:p>
+            <a:pPr algn="ctr"/>
+            <a:endParaRPr lang="en-US"/>
+          </a:p>
+        </p:txBody>
+      </p:sp>
+      <p:sp>
+        <p:nvSpPr>
+          <p:cNvPr id="18" name="Right Arrow 17"/>
+          <p:cNvSpPr/>
+          <p:nvPr/>
+        </p:nvSpPr>
+        <p:spPr>
+          <a:xfrm rot="16200000">
+            <a:off x="3032187" y="3080987"/>
+            <a:ext cx="462518" cy="775481"/>
+          </a:xfrm>
+          <a:prstGeom prst="rightArrow">
+            <a:avLst/>
+          </a:prstGeom>
+        </p:spPr>
+        <p:style>
+          <a:lnRef idx="2">
+            <a:schemeClr val="accent1">
+              <a:shade val="50000"/>
+            </a:schemeClr>
+          </a:lnRef>
+          <a:fillRef idx="1">
+            <a:schemeClr val="accent1"/>
+          </a:fillRef>
+          <a:effectRef idx="0">
+            <a:schemeClr val="accent1"/>
+          </a:effectRef>
+          <a:fontRef idx="minor">
+            <a:schemeClr val="lt1"/>
+          </a:fontRef>
+        </p:style>
+        <p:txBody>
+          <a:bodyPr rtlCol="0" anchor="ctr"/>
+          <a:lstStyle/>
+          <a:p>
+            <a:pPr algn="ctr"/>
+            <a:endParaRPr lang="en-US"/>
+          </a:p>
+        </p:txBody>
+      </p:sp>
+    </p:spTree>
+    <p:extLst>
+      <p:ext uri="{BB962C8B-B14F-4D97-AF65-F5344CB8AC3E}">
+        <p14:creationId xmlns:p14="http://schemas.microsoft.com/office/powerpoint/2010/main" val="2333232791"/>
+      </p:ext>
+    </p:extLst>
+  </p:cSld>
+  <p:clrMapOvr>
+    <a:masterClrMapping/>
+  </p:clrMapOvr>
+</p:sld>
+</file>
+
+<file path=ppt/slides/slide18.xml><?xml version="1.0" encoding="utf-8"?>
+<p:sld xmlns:a="http://schemas.openxmlformats.org/drawingml/2006/main" xmlns:r="http://schemas.openxmlformats.org/officeDocument/2006/relationships" xmlns:p="http://schemas.openxmlformats.org/presentationml/2006/main">
+  <p:cSld>
+    <p:spTree>
+      <p:nvGrpSpPr>
+        <p:cNvPr id="1" name=""/>
+        <p:cNvGrpSpPr/>
+        <p:nvPr/>
+      </p:nvGrpSpPr>
+      <p:grpSpPr>
+        <a:xfrm>
+          <a:off x="0" y="0"/>
+          <a:ext cx="0" cy="0"/>
+          <a:chOff x="0" y="0"/>
+          <a:chExt cx="0" cy="0"/>
+        </a:xfrm>
+      </p:grpSpPr>
+      <p:sp>
+        <p:nvSpPr>
+          <p:cNvPr id="2" name="Title 1"/>
+          <p:cNvSpPr>
+            <a:spLocks noGrp="1"/>
+          </p:cNvSpPr>
+          <p:nvPr>
+            <p:ph type="title"/>
+          </p:nvPr>
+        </p:nvSpPr>
+        <p:spPr/>
+        <p:txBody>
+          <a:bodyPr/>
+          <a:lstStyle/>
+          <a:p>
+            <a:r>
+              <a:rPr lang="en-US" dirty="0"/>
+              <a:t>“</a:t>
+            </a:r>
+            <a:r>
+              <a:rPr lang="ru-RU" dirty="0"/>
+              <a:t>Советники физического дизайна</a:t>
+            </a:r>
+            <a:r>
+              <a:rPr lang="en-US" dirty="0"/>
+              <a:t>”</a:t>
+            </a:r>
+          </a:p>
+        </p:txBody>
+      </p:sp>
+      <p:sp>
+        <p:nvSpPr>
+          <p:cNvPr id="3" name="Content Placeholder 2"/>
+          <p:cNvSpPr>
+            <a:spLocks noGrp="1"/>
+          </p:cNvSpPr>
+          <p:nvPr>
+            <p:ph idx="1"/>
+          </p:nvPr>
+        </p:nvSpPr>
+        <p:spPr/>
+        <p:txBody>
+          <a:bodyPr/>
+          <a:lstStyle/>
+          <a:p>
+            <a:r>
+              <a:rPr lang="ru-RU" dirty="0" smtClean="0"/>
+              <a:t>Советник меняет набор индексов и прогоняет через оптимизатор запросов</a:t>
+            </a:r>
+          </a:p>
+          <a:p>
+            <a:r>
+              <a:rPr lang="ru-RU" dirty="0" smtClean="0"/>
+              <a:t>Оценивая время выполнения и учитывая накладные расходы на пересчет индекса, советник выбирает лучший индекс</a:t>
+            </a:r>
+            <a:endParaRPr lang="en-US" dirty="0"/>
+          </a:p>
+        </p:txBody>
+      </p:sp>
+    </p:spTree>
+    <p:extLst>
+      <p:ext uri="{BB962C8B-B14F-4D97-AF65-F5344CB8AC3E}">
+        <p14:creationId xmlns:p14="http://schemas.microsoft.com/office/powerpoint/2010/main" val="4276547768"/>
+      </p:ext>
+    </p:extLst>
+  </p:cSld>
+  <p:clrMapOvr>
+    <a:masterClrMapping/>
+  </p:clrMapOvr>
+</p:sld>
+</file>
+
+<file path=ppt/slides/slide19.xml><?xml version="1.0" encoding="utf-8"?>
+<p:sld xmlns:a="http://schemas.openxmlformats.org/drawingml/2006/main" xmlns:r="http://schemas.openxmlformats.org/officeDocument/2006/relationships" xmlns:p="http://schemas.openxmlformats.org/presentationml/2006/main">
+  <p:cSld>
+    <p:spTree>
+      <p:nvGrpSpPr>
+        <p:cNvPr id="1" name=""/>
+        <p:cNvGrpSpPr/>
+        <p:nvPr/>
+      </p:nvGrpSpPr>
+      <p:grpSpPr>
+        <a:xfrm>
+          <a:off x="0" y="0"/>
+          <a:ext cx="0" cy="0"/>
+          <a:chOff x="0" y="0"/>
+          <a:chExt cx="0" cy="0"/>
+        </a:xfrm>
+      </p:grpSpPr>
+      <p:sp>
+        <p:nvSpPr>
+          <p:cNvPr id="2" name="Title 1"/>
+          <p:cNvSpPr>
+            <a:spLocks noGrp="1"/>
+          </p:cNvSpPr>
+          <p:nvPr>
+            <p:ph type="title"/>
+          </p:nvPr>
+        </p:nvSpPr>
+        <p:spPr/>
+        <p:txBody>
+          <a:bodyPr/>
+          <a:lstStyle/>
+          <a:p>
+            <a:r>
+              <a:rPr lang="ru-RU" dirty="0" smtClean="0"/>
+              <a:t>Синтаксис </a:t>
+            </a:r>
+            <a:r>
+              <a:rPr lang="en-US" dirty="0" smtClean="0"/>
+              <a:t>SQL</a:t>
+            </a:r>
+            <a:endParaRPr lang="en-US" dirty="0"/>
+          </a:p>
+        </p:txBody>
+      </p:sp>
+      <p:sp>
+        <p:nvSpPr>
+          <p:cNvPr id="3" name="Content Placeholder 2"/>
+          <p:cNvSpPr>
+            <a:spLocks noGrp="1"/>
+          </p:cNvSpPr>
+          <p:nvPr>
+            <p:ph idx="1"/>
+          </p:nvPr>
+        </p:nvSpPr>
+        <p:spPr/>
+        <p:txBody>
+          <a:bodyPr/>
+          <a:lstStyle/>
+          <a:p>
+            <a:pPr marL="0" indent="0">
+              <a:buNone/>
+            </a:pPr>
+            <a:r>
+              <a:rPr lang="en-US" dirty="0" smtClean="0"/>
+              <a:t>CREATE INDEX </a:t>
+            </a:r>
+            <a:r>
+              <a:rPr lang="en-US" dirty="0" err="1" smtClean="0">
+                <a:solidFill>
+                  <a:srgbClr val="00B0F0"/>
+                </a:solidFill>
+              </a:rPr>
+              <a:t>IndexName</a:t>
+            </a:r>
+            <a:r>
+              <a:rPr lang="en-US" dirty="0" smtClean="0">
+                <a:solidFill>
+                  <a:srgbClr val="00B0F0"/>
+                </a:solidFill>
+              </a:rPr>
+              <a:t> </a:t>
+            </a:r>
+            <a:r>
+              <a:rPr lang="en-US" dirty="0" smtClean="0"/>
+              <a:t>ON </a:t>
+            </a:r>
+            <a:r>
+              <a:rPr lang="en-US" dirty="0" smtClean="0">
+                <a:solidFill>
+                  <a:srgbClr val="00B0F0"/>
+                </a:solidFill>
+              </a:rPr>
+              <a:t>T(A)</a:t>
+            </a:r>
+          </a:p>
+          <a:p>
+            <a:pPr marL="0" indent="0">
+              <a:buNone/>
+            </a:pPr>
+            <a:r>
+              <a:rPr lang="en-US" dirty="0" smtClean="0"/>
+              <a:t>CREATE INDEX </a:t>
+            </a:r>
+            <a:r>
+              <a:rPr lang="en-US" dirty="0" err="1" smtClean="0">
+                <a:solidFill>
+                  <a:srgbClr val="00B0F0"/>
+                </a:solidFill>
+              </a:rPr>
+              <a:t>IndexName</a:t>
+            </a:r>
+            <a:r>
+              <a:rPr lang="en-US" dirty="0" smtClean="0">
+                <a:solidFill>
+                  <a:srgbClr val="00B0F0"/>
+                </a:solidFill>
+              </a:rPr>
+              <a:t> </a:t>
+            </a:r>
+            <a:r>
+              <a:rPr lang="en-US" dirty="0" smtClean="0"/>
+              <a:t>ON </a:t>
+            </a:r>
+            <a:r>
+              <a:rPr lang="en-US" dirty="0" smtClean="0">
+                <a:solidFill>
+                  <a:srgbClr val="00B0F0"/>
+                </a:solidFill>
+              </a:rPr>
+              <a:t>T(A1, A2, …, An)</a:t>
+            </a:r>
+          </a:p>
+          <a:p>
+            <a:pPr marL="0" indent="0">
+              <a:buNone/>
+            </a:pPr>
+            <a:r>
+              <a:rPr lang="en-US" dirty="0" smtClean="0"/>
+              <a:t>CREATE UNIQUE INDEX </a:t>
+            </a:r>
+            <a:r>
+              <a:rPr lang="en-US" dirty="0" err="1" smtClean="0">
+                <a:solidFill>
+                  <a:srgbClr val="00B0F0"/>
+                </a:solidFill>
+              </a:rPr>
+              <a:t>IndexName</a:t>
+            </a:r>
+            <a:r>
+              <a:rPr lang="en-US" dirty="0" smtClean="0">
+                <a:solidFill>
+                  <a:srgbClr val="00B0F0"/>
+                </a:solidFill>
+              </a:rPr>
+              <a:t> </a:t>
+            </a:r>
+            <a:r>
+              <a:rPr lang="en-US" dirty="0" smtClean="0"/>
+              <a:t>ON </a:t>
+            </a:r>
+            <a:r>
+              <a:rPr lang="en-US" dirty="0" smtClean="0">
+                <a:solidFill>
+                  <a:srgbClr val="00B0F0"/>
+                </a:solidFill>
+              </a:rPr>
+              <a:t>T(A)</a:t>
+            </a:r>
+          </a:p>
+          <a:p>
+            <a:pPr marL="0" indent="0">
+              <a:buNone/>
+            </a:pPr>
+            <a:r>
+              <a:rPr lang="en-US" dirty="0" smtClean="0"/>
+              <a:t>DROP INDEX </a:t>
+            </a:r>
+            <a:r>
+              <a:rPr lang="en-US" dirty="0" err="1" smtClean="0">
+                <a:solidFill>
+                  <a:srgbClr val="00B0F0"/>
+                </a:solidFill>
+              </a:rPr>
+              <a:t>IndexName</a:t>
+            </a:r>
+            <a:endParaRPr lang="en-US" dirty="0">
+              <a:solidFill>
+                <a:srgbClr val="00B0F0"/>
+              </a:solidFill>
+            </a:endParaRPr>
+          </a:p>
+        </p:txBody>
+      </p:sp>
+    </p:spTree>
+    <p:extLst>
+      <p:ext uri="{BB962C8B-B14F-4D97-AF65-F5344CB8AC3E}">
+        <p14:creationId xmlns:p14="http://schemas.microsoft.com/office/powerpoint/2010/main" val="728151246"/>
+      </p:ext>
+    </p:extLst>
+  </p:cSld>
+  <p:clrMapOvr>
+    <a:masterClrMapping/>
+  </p:clrMapOvr>
+</p:sld>
+</file>
+
 <file path=ppt/slides/slide2.xml><?xml version="1.0" encoding="utf-8"?>
 <p:sld xmlns:a="http://schemas.openxmlformats.org/drawingml/2006/main" xmlns:r="http://schemas.openxmlformats.org/officeDocument/2006/relationships" xmlns:p="http://schemas.openxmlformats.org/presentationml/2006/main">
   <p:cSld>
@@ -7366,6 +9043,94 @@
         </p:txBody>
       </p:sp>
     </p:spTree>
+  </p:cSld>
+  <p:clrMapOvr>
+    <a:masterClrMapping/>
+  </p:clrMapOvr>
+</p:sld>
+</file>
+
+<file path=ppt/slides/slide20.xml><?xml version="1.0" encoding="utf-8"?>
+<p:sld xmlns:a="http://schemas.openxmlformats.org/drawingml/2006/main" xmlns:r="http://schemas.openxmlformats.org/officeDocument/2006/relationships" xmlns:p="http://schemas.openxmlformats.org/presentationml/2006/main">
+  <p:cSld>
+    <p:spTree>
+      <p:nvGrpSpPr>
+        <p:cNvPr id="1" name=""/>
+        <p:cNvGrpSpPr/>
+        <p:nvPr/>
+      </p:nvGrpSpPr>
+      <p:grpSpPr>
+        <a:xfrm>
+          <a:off x="0" y="0"/>
+          <a:ext cx="0" cy="0"/>
+          <a:chOff x="0" y="0"/>
+          <a:chExt cx="0" cy="0"/>
+        </a:xfrm>
+      </p:grpSpPr>
+      <p:sp>
+        <p:nvSpPr>
+          <p:cNvPr id="2" name="Title 1"/>
+          <p:cNvSpPr>
+            <a:spLocks noGrp="1"/>
+          </p:cNvSpPr>
+          <p:nvPr>
+            <p:ph type="title"/>
+          </p:nvPr>
+        </p:nvSpPr>
+        <p:spPr/>
+        <p:txBody>
+          <a:bodyPr/>
+          <a:lstStyle/>
+          <a:p>
+            <a:r>
+              <a:rPr lang="ru-RU" dirty="0" smtClean="0"/>
+              <a:t>индексы</a:t>
+            </a:r>
+            <a:endParaRPr lang="en-US" dirty="0"/>
+          </a:p>
+        </p:txBody>
+      </p:sp>
+      <p:sp>
+        <p:nvSpPr>
+          <p:cNvPr id="3" name="Content Placeholder 2"/>
+          <p:cNvSpPr>
+            <a:spLocks noGrp="1"/>
+          </p:cNvSpPr>
+          <p:nvPr>
+            <p:ph idx="1"/>
+          </p:nvPr>
+        </p:nvSpPr>
+        <p:spPr/>
+        <p:txBody>
+          <a:bodyPr/>
+          <a:lstStyle/>
+          <a:p>
+            <a:r>
+              <a:rPr lang="ru-RU" dirty="0" smtClean="0"/>
+              <a:t>Основной механизм улучшения производительности базы данных</a:t>
+            </a:r>
+          </a:p>
+          <a:p>
+            <a:r>
+              <a:rPr lang="ru-RU" dirty="0" smtClean="0"/>
+              <a:t>Постоянно хранящаяся в базе структура данных</a:t>
+            </a:r>
+          </a:p>
+          <a:p>
+            <a:r>
+              <a:rPr lang="ru-RU" dirty="0" smtClean="0"/>
+              <a:t>Множество различных проблем реализации</a:t>
+            </a:r>
+            <a:endParaRPr lang="en-US" dirty="0"/>
+          </a:p>
+        </p:txBody>
+      </p:sp>
+    </p:spTree>
+    <p:extLst>
+      <p:ext uri="{BB962C8B-B14F-4D97-AF65-F5344CB8AC3E}">
+        <p14:creationId xmlns:p14="http://schemas.microsoft.com/office/powerpoint/2010/main" val="513402995"/>
+      </p:ext>
+    </p:extLst>
   </p:cSld>
   <p:clrMapOvr>
     <a:masterClrMapping/>
@@ -8052,15 +9817,7 @@
             </a:r>
             <a:r>
               <a:rPr lang="en-US" sz="2000" dirty="0" smtClean="0"/>
-              <a:t>T.A </a:t>
-            </a:r>
-            <a:r>
-              <a:rPr lang="ru-RU" sz="2000" dirty="0" smtClean="0"/>
-              <a:t>и </a:t>
-            </a:r>
-            <a:r>
-              <a:rPr lang="en-US" sz="2000" dirty="0" smtClean="0"/>
-              <a:t>T.B</a:t>
+              <a:t>T.(A,B)</a:t>
             </a:r>
             <a:endParaRPr lang="ru-RU" sz="2000" dirty="0"/>
           </a:p>
@@ -8131,27 +9888,82 @@
           <a:p>
             <a:r>
               <a:rPr lang="ru-RU" dirty="0" smtClean="0"/>
-              <a:t>Сканирование всей таблицы </a:t>
+              <a:t>Доступ с помощью индекса по сравнению со с</a:t>
+            </a:r>
+            <a:r>
+              <a:rPr lang="ru-RU" dirty="0" smtClean="0"/>
+              <a:t>канированием </a:t>
+            </a:r>
+            <a:r>
+              <a:rPr lang="ru-RU" dirty="0" smtClean="0"/>
+              <a:t>всей </a:t>
+            </a:r>
+            <a:r>
+              <a:rPr lang="ru-RU" dirty="0" smtClean="0"/>
+              <a:t>таблицы: </a:t>
             </a:r>
             <a:r>
               <a:rPr lang="en-US" dirty="0" smtClean="0"/>
-              <a:t>O(n) </a:t>
+              <a:t>T1&lt;O(log(N)) VS</a:t>
             </a:r>
             <a:r>
               <a:rPr lang="ru-RU" dirty="0" smtClean="0"/>
-              <a:t>сравнений</a:t>
-            </a:r>
-          </a:p>
-          <a:p>
+              <a:t> </a:t>
+            </a:r>
+            <a:r>
+              <a:rPr lang="en-US" dirty="0" smtClean="0"/>
+              <a:t>T2=O(</a:t>
+            </a:r>
+            <a:r>
+              <a:rPr lang="en-US" dirty="0"/>
+              <a:t>N</a:t>
+            </a:r>
             <a:r>
               <a:rPr lang="ru-RU" dirty="0" smtClean="0"/>
-              <a:t>Доступ с помощью индекса</a:t>
+              <a:t>)</a:t>
+            </a:r>
+            <a:endParaRPr lang="en-US" dirty="0" smtClean="0"/>
+          </a:p>
+          <a:p>
+            <a:r>
+              <a:rPr lang="ru-RU" dirty="0" smtClean="0"/>
+              <a:t>Базовая структура данных:</a:t>
+            </a:r>
+          </a:p>
+          <a:p>
+            <a:pPr lvl="1"/>
+            <a:r>
+              <a:rPr lang="ru-RU" dirty="0" smtClean="0"/>
+              <a:t>Сбалансированные деревья (</a:t>
             </a:r>
             <a:r>
               <a:rPr lang="en-US" dirty="0" smtClean="0"/>
-              <a:t> &lt;O(log(n))</a:t>
-            </a:r>
-            <a:endParaRPr lang="ru-RU" dirty="0"/>
+              <a:t>B</a:t>
+            </a:r>
+            <a:r>
+              <a:rPr lang="ru-RU" dirty="0" smtClean="0"/>
+              <a:t> деревья, </a:t>
+            </a:r>
+            <a:r>
+              <a:rPr lang="en-US" dirty="0" smtClean="0"/>
+              <a:t>B+</a:t>
+            </a:r>
+            <a:r>
+              <a:rPr lang="ru-RU" dirty="0" smtClean="0"/>
+              <a:t> </a:t>
+            </a:r>
+            <a:r>
+              <a:rPr lang="ru-RU" dirty="0" smtClean="0"/>
+              <a:t>деревья)</a:t>
+            </a:r>
+          </a:p>
+          <a:p>
+            <a:pPr lvl="1"/>
+            <a:r>
+              <a:rPr lang="ru-RU" dirty="0" smtClean="0"/>
+              <a:t>Хэш-таблицы</a:t>
+            </a:r>
+            <a:endParaRPr lang="ru-RU" dirty="0" smtClean="0"/>
           </a:p>
         </p:txBody>
       </p:sp>
@@ -9109,7 +10921,7 @@
   <a:extraClrSchemeLst/>
   <a:extLst>
     <a:ext uri="{05A4C25C-085E-4340-85A3-A5531E510DB2}">
-      <thm15:themeFamily xmlns="" xmlns:thm15="http://schemas.microsoft.com/office/thememl/2012/main" name="Mesh" id="{789EC3FE-34FD-429C-9918-760025E6C145}" vid="{B8BE45C0-8141-4D58-8C71-A009BC26FBBB}"/>
+      <thm15:themeFamily xmlns:thm15="http://schemas.microsoft.com/office/thememl/2012/main" name="Mesh" id="{789EC3FE-34FD-429C-9918-760025E6C145}" vid="{B8BE45C0-8141-4D58-8C71-A009BC26FBBB}"/>
     </a:ext>
   </a:extLst>
 </a:theme>
@@ -9370,7 +11182,7 @@
   <a:extraClrSchemeLst/>
   <a:extLst>
     <a:ext uri="{05A4C25C-085E-4340-85A3-A5531E510DB2}">
-      <thm15:themeFamily xmlns="" xmlns:thm15="http://schemas.microsoft.com/office/thememl/2012/main" name="Office Theme" id="{62F939B6-93AF-4DB8-9C6B-D6C7DFDC589F}" vid="{4A3C46E8-61CC-4603-A589-7422A47A8E4A}"/>
+      <thm15:themeFamily xmlns:thm15="http://schemas.microsoft.com/office/thememl/2012/main" name="Office Theme" id="{62F939B6-93AF-4DB8-9C6B-D6C7DFDC589F}" vid="{4A3C46E8-61CC-4603-A589-7422A47A8E4A}"/>
     </a:ext>
   </a:extLst>
 </a:theme>

</xml_diff>